<commit_message>
updated pix for pwl functions
</commit_message>
<xml_diff>
--- a/amr_schematics.pptx
+++ b/amr_schematics.pptx
@@ -6,6 +6,7 @@
   </p:sldMasterIdLst>
   <p:sldIdLst>
     <p:sldId id="256" r:id="rId2"/>
+    <p:sldId id="257" r:id="rId3"/>
   </p:sldIdLst>
   <p:sldSz cx="9144000" cy="6858000" type="screen4x3"/>
   <p:notesSz cx="6858000" cy="9144000"/>
@@ -4509,6 +4510,1129 @@
 </p:sld>
 </file>
 
+<file path=ppt/slides/slide2.xml><?xml version="1.0" encoding="utf-8"?>
+<p:sld xmlns:a="http://schemas.openxmlformats.org/drawingml/2006/main" xmlns:r="http://schemas.openxmlformats.org/officeDocument/2006/relationships" xmlns:p="http://schemas.openxmlformats.org/presentationml/2006/main">
+  <p:cSld>
+    <p:spTree>
+      <p:nvGrpSpPr>
+        <p:cNvPr id="1" name=""/>
+        <p:cNvGrpSpPr/>
+        <p:nvPr/>
+      </p:nvGrpSpPr>
+      <p:grpSpPr>
+        <a:xfrm>
+          <a:off x="0" y="0"/>
+          <a:ext cx="0" cy="0"/>
+          <a:chOff x="0" y="0"/>
+          <a:chExt cx="0" cy="0"/>
+        </a:xfrm>
+      </p:grpSpPr>
+      <p:grpSp>
+        <p:nvGrpSpPr>
+          <p:cNvPr id="19" name="Group 18"/>
+          <p:cNvGrpSpPr/>
+          <p:nvPr/>
+        </p:nvGrpSpPr>
+        <p:grpSpPr>
+          <a:xfrm>
+            <a:off x="1329142" y="2819854"/>
+            <a:ext cx="5300258" cy="2133146"/>
+            <a:chOff x="1329142" y="2819854"/>
+            <a:chExt cx="5300258" cy="2133146"/>
+          </a:xfrm>
+        </p:grpSpPr>
+        <p:sp>
+          <p:nvSpPr>
+            <p:cNvPr id="5" name="Oval 4"/>
+            <p:cNvSpPr/>
+            <p:nvPr/>
+          </p:nvSpPr>
+          <p:spPr>
+            <a:xfrm>
+              <a:off x="1329142" y="3435025"/>
+              <a:ext cx="137160" cy="137160"/>
+            </a:xfrm>
+            <a:prstGeom prst="ellipse">
+              <a:avLst/>
+            </a:prstGeom>
+            <a:solidFill>
+              <a:srgbClr val="FF0000"/>
+            </a:solidFill>
+            <a:ln w="9525">
+              <a:solidFill>
+                <a:srgbClr val="0070C0"/>
+              </a:solidFill>
+            </a:ln>
+          </p:spPr>
+          <p:style>
+            <a:lnRef idx="2">
+              <a:schemeClr val="accent1">
+                <a:shade val="50000"/>
+              </a:schemeClr>
+            </a:lnRef>
+            <a:fillRef idx="1">
+              <a:schemeClr val="accent1"/>
+            </a:fillRef>
+            <a:effectRef idx="0">
+              <a:schemeClr val="accent1"/>
+            </a:effectRef>
+            <a:fontRef idx="minor">
+              <a:schemeClr val="lt1"/>
+            </a:fontRef>
+          </p:style>
+          <p:txBody>
+            <a:bodyPr rtlCol="0" anchor="ctr"/>
+            <a:lstStyle/>
+            <a:p>
+              <a:pPr algn="ctr"/>
+              <a:endParaRPr lang="en-US">
+                <a:ln>
+                  <a:solidFill>
+                    <a:srgbClr val="FF0000"/>
+                  </a:solidFill>
+                </a:ln>
+                <a:solidFill>
+                  <a:srgbClr val="FF0000"/>
+                </a:solidFill>
+              </a:endParaRPr>
+            </a:p>
+          </p:txBody>
+        </p:sp>
+        <p:sp>
+          <p:nvSpPr>
+            <p:cNvPr id="6" name="Oval 5"/>
+            <p:cNvSpPr/>
+            <p:nvPr/>
+          </p:nvSpPr>
+          <p:spPr>
+            <a:xfrm>
+              <a:off x="3360420" y="3435025"/>
+              <a:ext cx="137160" cy="137160"/>
+            </a:xfrm>
+            <a:prstGeom prst="ellipse">
+              <a:avLst/>
+            </a:prstGeom>
+            <a:solidFill>
+              <a:srgbClr val="FF0000"/>
+            </a:solidFill>
+            <a:ln w="9525">
+              <a:solidFill>
+                <a:srgbClr val="0070C0"/>
+              </a:solidFill>
+            </a:ln>
+          </p:spPr>
+          <p:style>
+            <a:lnRef idx="2">
+              <a:schemeClr val="accent1">
+                <a:shade val="50000"/>
+              </a:schemeClr>
+            </a:lnRef>
+            <a:fillRef idx="1">
+              <a:schemeClr val="accent1"/>
+            </a:fillRef>
+            <a:effectRef idx="0">
+              <a:schemeClr val="accent1"/>
+            </a:effectRef>
+            <a:fontRef idx="minor">
+              <a:schemeClr val="lt1"/>
+            </a:fontRef>
+          </p:style>
+          <p:txBody>
+            <a:bodyPr rtlCol="0" anchor="ctr"/>
+            <a:lstStyle/>
+            <a:p>
+              <a:pPr algn="ctr"/>
+              <a:endParaRPr lang="en-US">
+                <a:ln>
+                  <a:solidFill>
+                    <a:srgbClr val="FF0000"/>
+                  </a:solidFill>
+                </a:ln>
+                <a:solidFill>
+                  <a:srgbClr val="FF0000"/>
+                </a:solidFill>
+              </a:endParaRPr>
+            </a:p>
+          </p:txBody>
+        </p:sp>
+        <p:sp>
+          <p:nvSpPr>
+            <p:cNvPr id="7" name="Oval 6"/>
+            <p:cNvSpPr/>
+            <p:nvPr/>
+          </p:nvSpPr>
+          <p:spPr>
+            <a:xfrm>
+              <a:off x="3360420" y="4808220"/>
+              <a:ext cx="137160" cy="137160"/>
+            </a:xfrm>
+            <a:prstGeom prst="ellipse">
+              <a:avLst/>
+            </a:prstGeom>
+            <a:solidFill>
+              <a:srgbClr val="FF0000"/>
+            </a:solidFill>
+            <a:ln w="9525">
+              <a:solidFill>
+                <a:srgbClr val="0070C0"/>
+              </a:solidFill>
+            </a:ln>
+          </p:spPr>
+          <p:style>
+            <a:lnRef idx="2">
+              <a:schemeClr val="accent1">
+                <a:shade val="50000"/>
+              </a:schemeClr>
+            </a:lnRef>
+            <a:fillRef idx="1">
+              <a:schemeClr val="accent1"/>
+            </a:fillRef>
+            <a:effectRef idx="0">
+              <a:schemeClr val="accent1"/>
+            </a:effectRef>
+            <a:fontRef idx="minor">
+              <a:schemeClr val="lt1"/>
+            </a:fontRef>
+          </p:style>
+          <p:txBody>
+            <a:bodyPr rtlCol="0" anchor="ctr"/>
+            <a:lstStyle/>
+            <a:p>
+              <a:pPr algn="ctr"/>
+              <a:endParaRPr lang="en-US">
+                <a:ln>
+                  <a:solidFill>
+                    <a:srgbClr val="FF0000"/>
+                  </a:solidFill>
+                </a:ln>
+                <a:solidFill>
+                  <a:srgbClr val="FF0000"/>
+                </a:solidFill>
+              </a:endParaRPr>
+            </a:p>
+          </p:txBody>
+        </p:sp>
+        <p:sp>
+          <p:nvSpPr>
+            <p:cNvPr id="8" name="Oval 7"/>
+            <p:cNvSpPr/>
+            <p:nvPr/>
+          </p:nvSpPr>
+          <p:spPr>
+            <a:xfrm>
+              <a:off x="2344781" y="2819854"/>
+              <a:ext cx="137160" cy="137160"/>
+            </a:xfrm>
+            <a:prstGeom prst="ellipse">
+              <a:avLst/>
+            </a:prstGeom>
+            <a:solidFill>
+              <a:srgbClr val="FF0000"/>
+            </a:solidFill>
+            <a:ln w="9525">
+              <a:solidFill>
+                <a:srgbClr val="0070C0"/>
+              </a:solidFill>
+            </a:ln>
+          </p:spPr>
+          <p:style>
+            <a:lnRef idx="2">
+              <a:schemeClr val="accent1">
+                <a:shade val="50000"/>
+              </a:schemeClr>
+            </a:lnRef>
+            <a:fillRef idx="1">
+              <a:schemeClr val="accent1"/>
+            </a:fillRef>
+            <a:effectRef idx="0">
+              <a:schemeClr val="accent1"/>
+            </a:effectRef>
+            <a:fontRef idx="minor">
+              <a:schemeClr val="lt1"/>
+            </a:fontRef>
+          </p:style>
+          <p:txBody>
+            <a:bodyPr rtlCol="0" anchor="ctr"/>
+            <a:lstStyle/>
+            <a:p>
+              <a:pPr algn="ctr"/>
+              <a:endParaRPr lang="en-US">
+                <a:ln>
+                  <a:solidFill>
+                    <a:srgbClr val="FF0000"/>
+                  </a:solidFill>
+                </a:ln>
+                <a:solidFill>
+                  <a:srgbClr val="FF0000"/>
+                </a:solidFill>
+              </a:endParaRPr>
+            </a:p>
+          </p:txBody>
+        </p:sp>
+        <p:sp>
+          <p:nvSpPr>
+            <p:cNvPr id="10" name="Oval 9"/>
+            <p:cNvSpPr/>
+            <p:nvPr/>
+          </p:nvSpPr>
+          <p:spPr>
+            <a:xfrm>
+              <a:off x="1329142" y="4808220"/>
+              <a:ext cx="137160" cy="137160"/>
+            </a:xfrm>
+            <a:prstGeom prst="ellipse">
+              <a:avLst/>
+            </a:prstGeom>
+            <a:solidFill>
+              <a:srgbClr val="FF0000"/>
+            </a:solidFill>
+            <a:ln w="9525">
+              <a:solidFill>
+                <a:srgbClr val="0070C0"/>
+              </a:solidFill>
+            </a:ln>
+          </p:spPr>
+          <p:style>
+            <a:lnRef idx="2">
+              <a:schemeClr val="accent1">
+                <a:shade val="50000"/>
+              </a:schemeClr>
+            </a:lnRef>
+            <a:fillRef idx="1">
+              <a:schemeClr val="accent1"/>
+            </a:fillRef>
+            <a:effectRef idx="0">
+              <a:schemeClr val="accent1"/>
+            </a:effectRef>
+            <a:fontRef idx="minor">
+              <a:schemeClr val="lt1"/>
+            </a:fontRef>
+          </p:style>
+          <p:txBody>
+            <a:bodyPr rtlCol="0" anchor="ctr"/>
+            <a:lstStyle/>
+            <a:p>
+              <a:pPr algn="ctr"/>
+              <a:endParaRPr lang="en-US">
+                <a:ln>
+                  <a:solidFill>
+                    <a:srgbClr val="FF0000"/>
+                  </a:solidFill>
+                </a:ln>
+                <a:solidFill>
+                  <a:srgbClr val="FF0000"/>
+                </a:solidFill>
+              </a:endParaRPr>
+            </a:p>
+          </p:txBody>
+        </p:sp>
+        <p:sp>
+          <p:nvSpPr>
+            <p:cNvPr id="11" name="Regular Pentagon 10"/>
+            <p:cNvSpPr/>
+            <p:nvPr/>
+          </p:nvSpPr>
+          <p:spPr>
+            <a:xfrm>
+              <a:off x="1397722" y="2888434"/>
+              <a:ext cx="2031278" cy="1988366"/>
+            </a:xfrm>
+            <a:custGeom>
+              <a:avLst/>
+              <a:gdLst>
+                <a:gd name="connsiteX0" fmla="*/ 3 w 2487133"/>
+                <a:gd name="connsiteY0" fmla="*/ 872698 h 2284760"/>
+                <a:gd name="connsiteX1" fmla="*/ 1243567 w 2487133"/>
+                <a:gd name="connsiteY1" fmla="*/ 0 h 2284760"/>
+                <a:gd name="connsiteX2" fmla="*/ 2487130 w 2487133"/>
+                <a:gd name="connsiteY2" fmla="*/ 872698 h 2284760"/>
+                <a:gd name="connsiteX3" fmla="*/ 2012131 w 2487133"/>
+                <a:gd name="connsiteY3" fmla="*/ 2284754 h 2284760"/>
+                <a:gd name="connsiteX4" fmla="*/ 475002 w 2487133"/>
+                <a:gd name="connsiteY4" fmla="*/ 2284754 h 2284760"/>
+                <a:gd name="connsiteX5" fmla="*/ 3 w 2487133"/>
+                <a:gd name="connsiteY5" fmla="*/ 872698 h 2284760"/>
+                <a:gd name="connsiteX0" fmla="*/ 0 w 2061677"/>
+                <a:gd name="connsiteY0" fmla="*/ 879048 h 2284754"/>
+                <a:gd name="connsiteX1" fmla="*/ 818114 w 2061677"/>
+                <a:gd name="connsiteY1" fmla="*/ 0 h 2284754"/>
+                <a:gd name="connsiteX2" fmla="*/ 2061677 w 2061677"/>
+                <a:gd name="connsiteY2" fmla="*/ 872698 h 2284754"/>
+                <a:gd name="connsiteX3" fmla="*/ 1586678 w 2061677"/>
+                <a:gd name="connsiteY3" fmla="*/ 2284754 h 2284754"/>
+                <a:gd name="connsiteX4" fmla="*/ 49549 w 2061677"/>
+                <a:gd name="connsiteY4" fmla="*/ 2284754 h 2284754"/>
+                <a:gd name="connsiteX5" fmla="*/ 0 w 2061677"/>
+                <a:gd name="connsiteY5" fmla="*/ 879048 h 2284754"/>
+                <a:gd name="connsiteX0" fmla="*/ 0 w 1636227"/>
+                <a:gd name="connsiteY0" fmla="*/ 879048 h 2284754"/>
+                <a:gd name="connsiteX1" fmla="*/ 818114 w 1636227"/>
+                <a:gd name="connsiteY1" fmla="*/ 0 h 2284754"/>
+                <a:gd name="connsiteX2" fmla="*/ 1636227 w 1636227"/>
+                <a:gd name="connsiteY2" fmla="*/ 891748 h 2284754"/>
+                <a:gd name="connsiteX3" fmla="*/ 1586678 w 1636227"/>
+                <a:gd name="connsiteY3" fmla="*/ 2284754 h 2284754"/>
+                <a:gd name="connsiteX4" fmla="*/ 49549 w 1636227"/>
+                <a:gd name="connsiteY4" fmla="*/ 2284754 h 2284754"/>
+                <a:gd name="connsiteX5" fmla="*/ 0 w 1636227"/>
+                <a:gd name="connsiteY5" fmla="*/ 879048 h 2284754"/>
+                <a:gd name="connsiteX0" fmla="*/ 0 w 1636227"/>
+                <a:gd name="connsiteY0" fmla="*/ 631398 h 2037104"/>
+                <a:gd name="connsiteX1" fmla="*/ 805414 w 1636227"/>
+                <a:gd name="connsiteY1" fmla="*/ 0 h 2037104"/>
+                <a:gd name="connsiteX2" fmla="*/ 1636227 w 1636227"/>
+                <a:gd name="connsiteY2" fmla="*/ 644098 h 2037104"/>
+                <a:gd name="connsiteX3" fmla="*/ 1586678 w 1636227"/>
+                <a:gd name="connsiteY3" fmla="*/ 2037104 h 2037104"/>
+                <a:gd name="connsiteX4" fmla="*/ 49549 w 1636227"/>
+                <a:gd name="connsiteY4" fmla="*/ 2037104 h 2037104"/>
+                <a:gd name="connsiteX5" fmla="*/ 0 w 1636227"/>
+                <a:gd name="connsiteY5" fmla="*/ 631398 h 2037104"/>
+                <a:gd name="connsiteX0" fmla="*/ 20301 w 1586678"/>
+                <a:gd name="connsiteY0" fmla="*/ 637748 h 2037104"/>
+                <a:gd name="connsiteX1" fmla="*/ 755865 w 1586678"/>
+                <a:gd name="connsiteY1" fmla="*/ 0 h 2037104"/>
+                <a:gd name="connsiteX2" fmla="*/ 1586678 w 1586678"/>
+                <a:gd name="connsiteY2" fmla="*/ 644098 h 2037104"/>
+                <a:gd name="connsiteX3" fmla="*/ 1537129 w 1586678"/>
+                <a:gd name="connsiteY3" fmla="*/ 2037104 h 2037104"/>
+                <a:gd name="connsiteX4" fmla="*/ 0 w 1586678"/>
+                <a:gd name="connsiteY4" fmla="*/ 2037104 h 2037104"/>
+                <a:gd name="connsiteX5" fmla="*/ 20301 w 1586678"/>
+                <a:gd name="connsiteY5" fmla="*/ 637748 h 2037104"/>
+                <a:gd name="connsiteX0" fmla="*/ 20301 w 1542228"/>
+                <a:gd name="connsiteY0" fmla="*/ 637748 h 2037104"/>
+                <a:gd name="connsiteX1" fmla="*/ 755865 w 1542228"/>
+                <a:gd name="connsiteY1" fmla="*/ 0 h 2037104"/>
+                <a:gd name="connsiteX2" fmla="*/ 1542228 w 1542228"/>
+                <a:gd name="connsiteY2" fmla="*/ 650448 h 2037104"/>
+                <a:gd name="connsiteX3" fmla="*/ 1537129 w 1542228"/>
+                <a:gd name="connsiteY3" fmla="*/ 2037104 h 2037104"/>
+                <a:gd name="connsiteX4" fmla="*/ 0 w 1542228"/>
+                <a:gd name="connsiteY4" fmla="*/ 2037104 h 2037104"/>
+                <a:gd name="connsiteX5" fmla="*/ 20301 w 1542228"/>
+                <a:gd name="connsiteY5" fmla="*/ 637748 h 2037104"/>
+                <a:gd name="connsiteX0" fmla="*/ 13951 w 1542228"/>
+                <a:gd name="connsiteY0" fmla="*/ 1025098 h 2037104"/>
+                <a:gd name="connsiteX1" fmla="*/ 755865 w 1542228"/>
+                <a:gd name="connsiteY1" fmla="*/ 0 h 2037104"/>
+                <a:gd name="connsiteX2" fmla="*/ 1542228 w 1542228"/>
+                <a:gd name="connsiteY2" fmla="*/ 650448 h 2037104"/>
+                <a:gd name="connsiteX3" fmla="*/ 1537129 w 1542228"/>
+                <a:gd name="connsiteY3" fmla="*/ 2037104 h 2037104"/>
+                <a:gd name="connsiteX4" fmla="*/ 0 w 1542228"/>
+                <a:gd name="connsiteY4" fmla="*/ 2037104 h 2037104"/>
+                <a:gd name="connsiteX5" fmla="*/ 13951 w 1542228"/>
+                <a:gd name="connsiteY5" fmla="*/ 1025098 h 2037104"/>
+                <a:gd name="connsiteX0" fmla="*/ 13951 w 1554928"/>
+                <a:gd name="connsiteY0" fmla="*/ 1025098 h 2037104"/>
+                <a:gd name="connsiteX1" fmla="*/ 755865 w 1554928"/>
+                <a:gd name="connsiteY1" fmla="*/ 0 h 2037104"/>
+                <a:gd name="connsiteX2" fmla="*/ 1554928 w 1554928"/>
+                <a:gd name="connsiteY2" fmla="*/ 853648 h 2037104"/>
+                <a:gd name="connsiteX3" fmla="*/ 1537129 w 1554928"/>
+                <a:gd name="connsiteY3" fmla="*/ 2037104 h 2037104"/>
+                <a:gd name="connsiteX4" fmla="*/ 0 w 1554928"/>
+                <a:gd name="connsiteY4" fmla="*/ 2037104 h 2037104"/>
+                <a:gd name="connsiteX5" fmla="*/ 13951 w 1554928"/>
+                <a:gd name="connsiteY5" fmla="*/ 1025098 h 2037104"/>
+                <a:gd name="connsiteX0" fmla="*/ 13951 w 1554928"/>
+                <a:gd name="connsiteY0" fmla="*/ 663148 h 2037104"/>
+                <a:gd name="connsiteX1" fmla="*/ 755865 w 1554928"/>
+                <a:gd name="connsiteY1" fmla="*/ 0 h 2037104"/>
+                <a:gd name="connsiteX2" fmla="*/ 1554928 w 1554928"/>
+                <a:gd name="connsiteY2" fmla="*/ 853648 h 2037104"/>
+                <a:gd name="connsiteX3" fmla="*/ 1537129 w 1554928"/>
+                <a:gd name="connsiteY3" fmla="*/ 2037104 h 2037104"/>
+                <a:gd name="connsiteX4" fmla="*/ 0 w 1554928"/>
+                <a:gd name="connsiteY4" fmla="*/ 2037104 h 2037104"/>
+                <a:gd name="connsiteX5" fmla="*/ 13951 w 1554928"/>
+                <a:gd name="connsiteY5" fmla="*/ 663148 h 2037104"/>
+                <a:gd name="connsiteX0" fmla="*/ 13951 w 1559691"/>
+                <a:gd name="connsiteY0" fmla="*/ 663148 h 2037104"/>
+                <a:gd name="connsiteX1" fmla="*/ 755865 w 1559691"/>
+                <a:gd name="connsiteY1" fmla="*/ 0 h 2037104"/>
+                <a:gd name="connsiteX2" fmla="*/ 1559691 w 1559691"/>
+                <a:gd name="connsiteY2" fmla="*/ 663148 h 2037104"/>
+                <a:gd name="connsiteX3" fmla="*/ 1537129 w 1559691"/>
+                <a:gd name="connsiteY3" fmla="*/ 2037104 h 2037104"/>
+                <a:gd name="connsiteX4" fmla="*/ 0 w 1559691"/>
+                <a:gd name="connsiteY4" fmla="*/ 2037104 h 2037104"/>
+                <a:gd name="connsiteX5" fmla="*/ 13951 w 1559691"/>
+                <a:gd name="connsiteY5" fmla="*/ 663148 h 2037104"/>
+                <a:gd name="connsiteX0" fmla="*/ 13951 w 1540641"/>
+                <a:gd name="connsiteY0" fmla="*/ 663148 h 2037104"/>
+                <a:gd name="connsiteX1" fmla="*/ 755865 w 1540641"/>
+                <a:gd name="connsiteY1" fmla="*/ 0 h 2037104"/>
+                <a:gd name="connsiteX2" fmla="*/ 1540641 w 1540641"/>
+                <a:gd name="connsiteY2" fmla="*/ 667910 h 2037104"/>
+                <a:gd name="connsiteX3" fmla="*/ 1537129 w 1540641"/>
+                <a:gd name="connsiteY3" fmla="*/ 2037104 h 2037104"/>
+                <a:gd name="connsiteX4" fmla="*/ 0 w 1540641"/>
+                <a:gd name="connsiteY4" fmla="*/ 2037104 h 2037104"/>
+                <a:gd name="connsiteX5" fmla="*/ 13951 w 1540641"/>
+                <a:gd name="connsiteY5" fmla="*/ 663148 h 2037104"/>
+                <a:gd name="connsiteX0" fmla="*/ 0 w 1526690"/>
+                <a:gd name="connsiteY0" fmla="*/ 663148 h 2037104"/>
+                <a:gd name="connsiteX1" fmla="*/ 741914 w 1526690"/>
+                <a:gd name="connsiteY1" fmla="*/ 0 h 2037104"/>
+                <a:gd name="connsiteX2" fmla="*/ 1526690 w 1526690"/>
+                <a:gd name="connsiteY2" fmla="*/ 667910 h 2037104"/>
+                <a:gd name="connsiteX3" fmla="*/ 1523178 w 1526690"/>
+                <a:gd name="connsiteY3" fmla="*/ 2037104 h 2037104"/>
+                <a:gd name="connsiteX4" fmla="*/ 337 w 1526690"/>
+                <a:gd name="connsiteY4" fmla="*/ 2032341 h 2037104"/>
+                <a:gd name="connsiteX5" fmla="*/ 0 w 1526690"/>
+                <a:gd name="connsiteY5" fmla="*/ 663148 h 2037104"/>
+                <a:gd name="connsiteX0" fmla="*/ 0 w 1526690"/>
+                <a:gd name="connsiteY0" fmla="*/ 648860 h 2022816"/>
+                <a:gd name="connsiteX1" fmla="*/ 770489 w 1526690"/>
+                <a:gd name="connsiteY1" fmla="*/ 0 h 2022816"/>
+                <a:gd name="connsiteX2" fmla="*/ 1526690 w 1526690"/>
+                <a:gd name="connsiteY2" fmla="*/ 653622 h 2022816"/>
+                <a:gd name="connsiteX3" fmla="*/ 1523178 w 1526690"/>
+                <a:gd name="connsiteY3" fmla="*/ 2022816 h 2022816"/>
+                <a:gd name="connsiteX4" fmla="*/ 337 w 1526690"/>
+                <a:gd name="connsiteY4" fmla="*/ 2018053 h 2022816"/>
+                <a:gd name="connsiteX5" fmla="*/ 0 w 1526690"/>
+                <a:gd name="connsiteY5" fmla="*/ 648860 h 2022816"/>
+              </a:gdLst>
+              <a:ahLst/>
+              <a:cxnLst>
+                <a:cxn ang="0">
+                  <a:pos x="connsiteX0" y="connsiteY0"/>
+                </a:cxn>
+                <a:cxn ang="0">
+                  <a:pos x="connsiteX1" y="connsiteY1"/>
+                </a:cxn>
+                <a:cxn ang="0">
+                  <a:pos x="connsiteX2" y="connsiteY2"/>
+                </a:cxn>
+                <a:cxn ang="0">
+                  <a:pos x="connsiteX3" y="connsiteY3"/>
+                </a:cxn>
+                <a:cxn ang="0">
+                  <a:pos x="connsiteX4" y="connsiteY4"/>
+                </a:cxn>
+                <a:cxn ang="0">
+                  <a:pos x="connsiteX5" y="connsiteY5"/>
+                </a:cxn>
+              </a:cxnLst>
+              <a:rect l="l" t="t" r="r" b="b"/>
+              <a:pathLst>
+                <a:path w="1526690" h="2022816">
+                  <a:moveTo>
+                    <a:pt x="0" y="648860"/>
+                  </a:moveTo>
+                  <a:lnTo>
+                    <a:pt x="770489" y="0"/>
+                  </a:lnTo>
+                  <a:lnTo>
+                    <a:pt x="1526690" y="653622"/>
+                  </a:lnTo>
+                  <a:cubicBezTo>
+                    <a:pt x="1524990" y="1115841"/>
+                    <a:pt x="1524878" y="1560597"/>
+                    <a:pt x="1523178" y="2022816"/>
+                  </a:cubicBezTo>
+                  <a:lnTo>
+                    <a:pt x="337" y="2018053"/>
+                  </a:lnTo>
+                  <a:cubicBezTo>
+                    <a:pt x="225" y="1561655"/>
+                    <a:pt x="112" y="1105258"/>
+                    <a:pt x="0" y="648860"/>
+                  </a:cubicBezTo>
+                  <a:close/>
+                </a:path>
+              </a:pathLst>
+            </a:custGeom>
+            <a:noFill/>
+          </p:spPr>
+          <p:style>
+            <a:lnRef idx="2">
+              <a:schemeClr val="accent1">
+                <a:shade val="50000"/>
+              </a:schemeClr>
+            </a:lnRef>
+            <a:fillRef idx="1">
+              <a:schemeClr val="accent1"/>
+            </a:fillRef>
+            <a:effectRef idx="0">
+              <a:schemeClr val="accent1"/>
+            </a:effectRef>
+            <a:fontRef idx="minor">
+              <a:schemeClr val="lt1"/>
+            </a:fontRef>
+          </p:style>
+          <p:txBody>
+            <a:bodyPr rtlCol="0" anchor="ctr"/>
+            <a:lstStyle/>
+            <a:p>
+              <a:pPr algn="ctr"/>
+              <a:endParaRPr lang="en-US"/>
+            </a:p>
+          </p:txBody>
+        </p:sp>
+        <p:sp>
+          <p:nvSpPr>
+            <p:cNvPr id="13" name="Oval 12"/>
+            <p:cNvSpPr/>
+            <p:nvPr/>
+          </p:nvSpPr>
+          <p:spPr>
+            <a:xfrm>
+              <a:off x="4460962" y="3442645"/>
+              <a:ext cx="137160" cy="137160"/>
+            </a:xfrm>
+            <a:prstGeom prst="ellipse">
+              <a:avLst/>
+            </a:prstGeom>
+            <a:solidFill>
+              <a:srgbClr val="FF0000"/>
+            </a:solidFill>
+            <a:ln w="9525">
+              <a:solidFill>
+                <a:srgbClr val="0070C0"/>
+              </a:solidFill>
+            </a:ln>
+          </p:spPr>
+          <p:style>
+            <a:lnRef idx="2">
+              <a:schemeClr val="accent1">
+                <a:shade val="50000"/>
+              </a:schemeClr>
+            </a:lnRef>
+            <a:fillRef idx="1">
+              <a:schemeClr val="accent1"/>
+            </a:fillRef>
+            <a:effectRef idx="0">
+              <a:schemeClr val="accent1"/>
+            </a:effectRef>
+            <a:fontRef idx="minor">
+              <a:schemeClr val="lt1"/>
+            </a:fontRef>
+          </p:style>
+          <p:txBody>
+            <a:bodyPr rtlCol="0" anchor="ctr"/>
+            <a:lstStyle/>
+            <a:p>
+              <a:pPr algn="ctr"/>
+              <a:endParaRPr lang="en-US">
+                <a:ln>
+                  <a:solidFill>
+                    <a:srgbClr val="FF0000"/>
+                  </a:solidFill>
+                </a:ln>
+                <a:solidFill>
+                  <a:srgbClr val="FF0000"/>
+                </a:solidFill>
+              </a:endParaRPr>
+            </a:p>
+          </p:txBody>
+        </p:sp>
+        <p:sp>
+          <p:nvSpPr>
+            <p:cNvPr id="14" name="Oval 13"/>
+            <p:cNvSpPr/>
+            <p:nvPr/>
+          </p:nvSpPr>
+          <p:spPr>
+            <a:xfrm>
+              <a:off x="6492240" y="3442645"/>
+              <a:ext cx="137160" cy="137160"/>
+            </a:xfrm>
+            <a:prstGeom prst="ellipse">
+              <a:avLst/>
+            </a:prstGeom>
+            <a:solidFill>
+              <a:srgbClr val="FF0000"/>
+            </a:solidFill>
+            <a:ln w="9525">
+              <a:solidFill>
+                <a:srgbClr val="0070C0"/>
+              </a:solidFill>
+            </a:ln>
+          </p:spPr>
+          <p:style>
+            <a:lnRef idx="2">
+              <a:schemeClr val="accent1">
+                <a:shade val="50000"/>
+              </a:schemeClr>
+            </a:lnRef>
+            <a:fillRef idx="1">
+              <a:schemeClr val="accent1"/>
+            </a:fillRef>
+            <a:effectRef idx="0">
+              <a:schemeClr val="accent1"/>
+            </a:effectRef>
+            <a:fontRef idx="minor">
+              <a:schemeClr val="lt1"/>
+            </a:fontRef>
+          </p:style>
+          <p:txBody>
+            <a:bodyPr rtlCol="0" anchor="ctr"/>
+            <a:lstStyle/>
+            <a:p>
+              <a:pPr algn="ctr"/>
+              <a:endParaRPr lang="en-US">
+                <a:ln>
+                  <a:solidFill>
+                    <a:srgbClr val="FF0000"/>
+                  </a:solidFill>
+                </a:ln>
+                <a:solidFill>
+                  <a:srgbClr val="FF0000"/>
+                </a:solidFill>
+              </a:endParaRPr>
+            </a:p>
+          </p:txBody>
+        </p:sp>
+        <p:sp>
+          <p:nvSpPr>
+            <p:cNvPr id="15" name="Oval 14"/>
+            <p:cNvSpPr/>
+            <p:nvPr/>
+          </p:nvSpPr>
+          <p:spPr>
+            <a:xfrm>
+              <a:off x="6492240" y="4815840"/>
+              <a:ext cx="137160" cy="137160"/>
+            </a:xfrm>
+            <a:prstGeom prst="ellipse">
+              <a:avLst/>
+            </a:prstGeom>
+            <a:solidFill>
+              <a:srgbClr val="FF0000"/>
+            </a:solidFill>
+            <a:ln w="9525">
+              <a:solidFill>
+                <a:srgbClr val="0070C0"/>
+              </a:solidFill>
+            </a:ln>
+          </p:spPr>
+          <p:style>
+            <a:lnRef idx="2">
+              <a:schemeClr val="accent1">
+                <a:shade val="50000"/>
+              </a:schemeClr>
+            </a:lnRef>
+            <a:fillRef idx="1">
+              <a:schemeClr val="accent1"/>
+            </a:fillRef>
+            <a:effectRef idx="0">
+              <a:schemeClr val="accent1"/>
+            </a:effectRef>
+            <a:fontRef idx="minor">
+              <a:schemeClr val="lt1"/>
+            </a:fontRef>
+          </p:style>
+          <p:txBody>
+            <a:bodyPr rtlCol="0" anchor="ctr"/>
+            <a:lstStyle/>
+            <a:p>
+              <a:pPr algn="ctr"/>
+              <a:endParaRPr lang="en-US">
+                <a:ln>
+                  <a:solidFill>
+                    <a:srgbClr val="FF0000"/>
+                  </a:solidFill>
+                </a:ln>
+                <a:solidFill>
+                  <a:srgbClr val="FF0000"/>
+                </a:solidFill>
+              </a:endParaRPr>
+            </a:p>
+          </p:txBody>
+        </p:sp>
+        <p:sp>
+          <p:nvSpPr>
+            <p:cNvPr id="16" name="Oval 15"/>
+            <p:cNvSpPr/>
+            <p:nvPr/>
+          </p:nvSpPr>
+          <p:spPr>
+            <a:xfrm>
+              <a:off x="5492519" y="3465283"/>
+              <a:ext cx="137160" cy="137160"/>
+            </a:xfrm>
+            <a:prstGeom prst="ellipse">
+              <a:avLst/>
+            </a:prstGeom>
+            <a:solidFill>
+              <a:srgbClr val="FF0000"/>
+            </a:solidFill>
+            <a:ln w="9525">
+              <a:solidFill>
+                <a:srgbClr val="0070C0"/>
+              </a:solidFill>
+            </a:ln>
+          </p:spPr>
+          <p:style>
+            <a:lnRef idx="2">
+              <a:schemeClr val="accent1">
+                <a:shade val="50000"/>
+              </a:schemeClr>
+            </a:lnRef>
+            <a:fillRef idx="1">
+              <a:schemeClr val="accent1"/>
+            </a:fillRef>
+            <a:effectRef idx="0">
+              <a:schemeClr val="accent1"/>
+            </a:effectRef>
+            <a:fontRef idx="minor">
+              <a:schemeClr val="lt1"/>
+            </a:fontRef>
+          </p:style>
+          <p:txBody>
+            <a:bodyPr rtlCol="0" anchor="ctr"/>
+            <a:lstStyle/>
+            <a:p>
+              <a:pPr algn="ctr"/>
+              <a:endParaRPr lang="en-US">
+                <a:ln>
+                  <a:solidFill>
+                    <a:srgbClr val="FF0000"/>
+                  </a:solidFill>
+                </a:ln>
+                <a:solidFill>
+                  <a:srgbClr val="FF0000"/>
+                </a:solidFill>
+              </a:endParaRPr>
+            </a:p>
+          </p:txBody>
+        </p:sp>
+        <p:sp>
+          <p:nvSpPr>
+            <p:cNvPr id="17" name="Oval 16"/>
+            <p:cNvSpPr/>
+            <p:nvPr/>
+          </p:nvSpPr>
+          <p:spPr>
+            <a:xfrm>
+              <a:off x="4460962" y="4815840"/>
+              <a:ext cx="137160" cy="137160"/>
+            </a:xfrm>
+            <a:prstGeom prst="ellipse">
+              <a:avLst/>
+            </a:prstGeom>
+            <a:solidFill>
+              <a:srgbClr val="FF0000"/>
+            </a:solidFill>
+            <a:ln w="9525">
+              <a:solidFill>
+                <a:srgbClr val="0070C0"/>
+              </a:solidFill>
+            </a:ln>
+          </p:spPr>
+          <p:style>
+            <a:lnRef idx="2">
+              <a:schemeClr val="accent1">
+                <a:shade val="50000"/>
+              </a:schemeClr>
+            </a:lnRef>
+            <a:fillRef idx="1">
+              <a:schemeClr val="accent1"/>
+            </a:fillRef>
+            <a:effectRef idx="0">
+              <a:schemeClr val="accent1"/>
+            </a:effectRef>
+            <a:fontRef idx="minor">
+              <a:schemeClr val="lt1"/>
+            </a:fontRef>
+          </p:style>
+          <p:txBody>
+            <a:bodyPr rtlCol="0" anchor="ctr"/>
+            <a:lstStyle/>
+            <a:p>
+              <a:pPr algn="ctr"/>
+              <a:endParaRPr lang="en-US">
+                <a:ln>
+                  <a:solidFill>
+                    <a:srgbClr val="FF0000"/>
+                  </a:solidFill>
+                </a:ln>
+                <a:solidFill>
+                  <a:srgbClr val="FF0000"/>
+                </a:solidFill>
+              </a:endParaRPr>
+            </a:p>
+          </p:txBody>
+        </p:sp>
+        <p:sp>
+          <p:nvSpPr>
+            <p:cNvPr id="18" name="Regular Pentagon 10"/>
+            <p:cNvSpPr/>
+            <p:nvPr/>
+          </p:nvSpPr>
+          <p:spPr>
+            <a:xfrm>
+              <a:off x="4529542" y="3533863"/>
+              <a:ext cx="2031278" cy="1350557"/>
+            </a:xfrm>
+            <a:custGeom>
+              <a:avLst/>
+              <a:gdLst>
+                <a:gd name="connsiteX0" fmla="*/ 3 w 2487133"/>
+                <a:gd name="connsiteY0" fmla="*/ 872698 h 2284760"/>
+                <a:gd name="connsiteX1" fmla="*/ 1243567 w 2487133"/>
+                <a:gd name="connsiteY1" fmla="*/ 0 h 2284760"/>
+                <a:gd name="connsiteX2" fmla="*/ 2487130 w 2487133"/>
+                <a:gd name="connsiteY2" fmla="*/ 872698 h 2284760"/>
+                <a:gd name="connsiteX3" fmla="*/ 2012131 w 2487133"/>
+                <a:gd name="connsiteY3" fmla="*/ 2284754 h 2284760"/>
+                <a:gd name="connsiteX4" fmla="*/ 475002 w 2487133"/>
+                <a:gd name="connsiteY4" fmla="*/ 2284754 h 2284760"/>
+                <a:gd name="connsiteX5" fmla="*/ 3 w 2487133"/>
+                <a:gd name="connsiteY5" fmla="*/ 872698 h 2284760"/>
+                <a:gd name="connsiteX0" fmla="*/ 0 w 2061677"/>
+                <a:gd name="connsiteY0" fmla="*/ 879048 h 2284754"/>
+                <a:gd name="connsiteX1" fmla="*/ 818114 w 2061677"/>
+                <a:gd name="connsiteY1" fmla="*/ 0 h 2284754"/>
+                <a:gd name="connsiteX2" fmla="*/ 2061677 w 2061677"/>
+                <a:gd name="connsiteY2" fmla="*/ 872698 h 2284754"/>
+                <a:gd name="connsiteX3" fmla="*/ 1586678 w 2061677"/>
+                <a:gd name="connsiteY3" fmla="*/ 2284754 h 2284754"/>
+                <a:gd name="connsiteX4" fmla="*/ 49549 w 2061677"/>
+                <a:gd name="connsiteY4" fmla="*/ 2284754 h 2284754"/>
+                <a:gd name="connsiteX5" fmla="*/ 0 w 2061677"/>
+                <a:gd name="connsiteY5" fmla="*/ 879048 h 2284754"/>
+                <a:gd name="connsiteX0" fmla="*/ 0 w 1636227"/>
+                <a:gd name="connsiteY0" fmla="*/ 879048 h 2284754"/>
+                <a:gd name="connsiteX1" fmla="*/ 818114 w 1636227"/>
+                <a:gd name="connsiteY1" fmla="*/ 0 h 2284754"/>
+                <a:gd name="connsiteX2" fmla="*/ 1636227 w 1636227"/>
+                <a:gd name="connsiteY2" fmla="*/ 891748 h 2284754"/>
+                <a:gd name="connsiteX3" fmla="*/ 1586678 w 1636227"/>
+                <a:gd name="connsiteY3" fmla="*/ 2284754 h 2284754"/>
+                <a:gd name="connsiteX4" fmla="*/ 49549 w 1636227"/>
+                <a:gd name="connsiteY4" fmla="*/ 2284754 h 2284754"/>
+                <a:gd name="connsiteX5" fmla="*/ 0 w 1636227"/>
+                <a:gd name="connsiteY5" fmla="*/ 879048 h 2284754"/>
+                <a:gd name="connsiteX0" fmla="*/ 0 w 1636227"/>
+                <a:gd name="connsiteY0" fmla="*/ 631398 h 2037104"/>
+                <a:gd name="connsiteX1" fmla="*/ 805414 w 1636227"/>
+                <a:gd name="connsiteY1" fmla="*/ 0 h 2037104"/>
+                <a:gd name="connsiteX2" fmla="*/ 1636227 w 1636227"/>
+                <a:gd name="connsiteY2" fmla="*/ 644098 h 2037104"/>
+                <a:gd name="connsiteX3" fmla="*/ 1586678 w 1636227"/>
+                <a:gd name="connsiteY3" fmla="*/ 2037104 h 2037104"/>
+                <a:gd name="connsiteX4" fmla="*/ 49549 w 1636227"/>
+                <a:gd name="connsiteY4" fmla="*/ 2037104 h 2037104"/>
+                <a:gd name="connsiteX5" fmla="*/ 0 w 1636227"/>
+                <a:gd name="connsiteY5" fmla="*/ 631398 h 2037104"/>
+                <a:gd name="connsiteX0" fmla="*/ 20301 w 1586678"/>
+                <a:gd name="connsiteY0" fmla="*/ 637748 h 2037104"/>
+                <a:gd name="connsiteX1" fmla="*/ 755865 w 1586678"/>
+                <a:gd name="connsiteY1" fmla="*/ 0 h 2037104"/>
+                <a:gd name="connsiteX2" fmla="*/ 1586678 w 1586678"/>
+                <a:gd name="connsiteY2" fmla="*/ 644098 h 2037104"/>
+                <a:gd name="connsiteX3" fmla="*/ 1537129 w 1586678"/>
+                <a:gd name="connsiteY3" fmla="*/ 2037104 h 2037104"/>
+                <a:gd name="connsiteX4" fmla="*/ 0 w 1586678"/>
+                <a:gd name="connsiteY4" fmla="*/ 2037104 h 2037104"/>
+                <a:gd name="connsiteX5" fmla="*/ 20301 w 1586678"/>
+                <a:gd name="connsiteY5" fmla="*/ 637748 h 2037104"/>
+                <a:gd name="connsiteX0" fmla="*/ 20301 w 1542228"/>
+                <a:gd name="connsiteY0" fmla="*/ 637748 h 2037104"/>
+                <a:gd name="connsiteX1" fmla="*/ 755865 w 1542228"/>
+                <a:gd name="connsiteY1" fmla="*/ 0 h 2037104"/>
+                <a:gd name="connsiteX2" fmla="*/ 1542228 w 1542228"/>
+                <a:gd name="connsiteY2" fmla="*/ 650448 h 2037104"/>
+                <a:gd name="connsiteX3" fmla="*/ 1537129 w 1542228"/>
+                <a:gd name="connsiteY3" fmla="*/ 2037104 h 2037104"/>
+                <a:gd name="connsiteX4" fmla="*/ 0 w 1542228"/>
+                <a:gd name="connsiteY4" fmla="*/ 2037104 h 2037104"/>
+                <a:gd name="connsiteX5" fmla="*/ 20301 w 1542228"/>
+                <a:gd name="connsiteY5" fmla="*/ 637748 h 2037104"/>
+                <a:gd name="connsiteX0" fmla="*/ 13951 w 1542228"/>
+                <a:gd name="connsiteY0" fmla="*/ 1025098 h 2037104"/>
+                <a:gd name="connsiteX1" fmla="*/ 755865 w 1542228"/>
+                <a:gd name="connsiteY1" fmla="*/ 0 h 2037104"/>
+                <a:gd name="connsiteX2" fmla="*/ 1542228 w 1542228"/>
+                <a:gd name="connsiteY2" fmla="*/ 650448 h 2037104"/>
+                <a:gd name="connsiteX3" fmla="*/ 1537129 w 1542228"/>
+                <a:gd name="connsiteY3" fmla="*/ 2037104 h 2037104"/>
+                <a:gd name="connsiteX4" fmla="*/ 0 w 1542228"/>
+                <a:gd name="connsiteY4" fmla="*/ 2037104 h 2037104"/>
+                <a:gd name="connsiteX5" fmla="*/ 13951 w 1542228"/>
+                <a:gd name="connsiteY5" fmla="*/ 1025098 h 2037104"/>
+                <a:gd name="connsiteX0" fmla="*/ 13951 w 1554928"/>
+                <a:gd name="connsiteY0" fmla="*/ 1025098 h 2037104"/>
+                <a:gd name="connsiteX1" fmla="*/ 755865 w 1554928"/>
+                <a:gd name="connsiteY1" fmla="*/ 0 h 2037104"/>
+                <a:gd name="connsiteX2" fmla="*/ 1554928 w 1554928"/>
+                <a:gd name="connsiteY2" fmla="*/ 853648 h 2037104"/>
+                <a:gd name="connsiteX3" fmla="*/ 1537129 w 1554928"/>
+                <a:gd name="connsiteY3" fmla="*/ 2037104 h 2037104"/>
+                <a:gd name="connsiteX4" fmla="*/ 0 w 1554928"/>
+                <a:gd name="connsiteY4" fmla="*/ 2037104 h 2037104"/>
+                <a:gd name="connsiteX5" fmla="*/ 13951 w 1554928"/>
+                <a:gd name="connsiteY5" fmla="*/ 1025098 h 2037104"/>
+                <a:gd name="connsiteX0" fmla="*/ 13951 w 1554928"/>
+                <a:gd name="connsiteY0" fmla="*/ 663148 h 2037104"/>
+                <a:gd name="connsiteX1" fmla="*/ 755865 w 1554928"/>
+                <a:gd name="connsiteY1" fmla="*/ 0 h 2037104"/>
+                <a:gd name="connsiteX2" fmla="*/ 1554928 w 1554928"/>
+                <a:gd name="connsiteY2" fmla="*/ 853648 h 2037104"/>
+                <a:gd name="connsiteX3" fmla="*/ 1537129 w 1554928"/>
+                <a:gd name="connsiteY3" fmla="*/ 2037104 h 2037104"/>
+                <a:gd name="connsiteX4" fmla="*/ 0 w 1554928"/>
+                <a:gd name="connsiteY4" fmla="*/ 2037104 h 2037104"/>
+                <a:gd name="connsiteX5" fmla="*/ 13951 w 1554928"/>
+                <a:gd name="connsiteY5" fmla="*/ 663148 h 2037104"/>
+                <a:gd name="connsiteX0" fmla="*/ 13951 w 1559691"/>
+                <a:gd name="connsiteY0" fmla="*/ 663148 h 2037104"/>
+                <a:gd name="connsiteX1" fmla="*/ 755865 w 1559691"/>
+                <a:gd name="connsiteY1" fmla="*/ 0 h 2037104"/>
+                <a:gd name="connsiteX2" fmla="*/ 1559691 w 1559691"/>
+                <a:gd name="connsiteY2" fmla="*/ 663148 h 2037104"/>
+                <a:gd name="connsiteX3" fmla="*/ 1537129 w 1559691"/>
+                <a:gd name="connsiteY3" fmla="*/ 2037104 h 2037104"/>
+                <a:gd name="connsiteX4" fmla="*/ 0 w 1559691"/>
+                <a:gd name="connsiteY4" fmla="*/ 2037104 h 2037104"/>
+                <a:gd name="connsiteX5" fmla="*/ 13951 w 1559691"/>
+                <a:gd name="connsiteY5" fmla="*/ 663148 h 2037104"/>
+                <a:gd name="connsiteX0" fmla="*/ 13951 w 1540641"/>
+                <a:gd name="connsiteY0" fmla="*/ 663148 h 2037104"/>
+                <a:gd name="connsiteX1" fmla="*/ 755865 w 1540641"/>
+                <a:gd name="connsiteY1" fmla="*/ 0 h 2037104"/>
+                <a:gd name="connsiteX2" fmla="*/ 1540641 w 1540641"/>
+                <a:gd name="connsiteY2" fmla="*/ 667910 h 2037104"/>
+                <a:gd name="connsiteX3" fmla="*/ 1537129 w 1540641"/>
+                <a:gd name="connsiteY3" fmla="*/ 2037104 h 2037104"/>
+                <a:gd name="connsiteX4" fmla="*/ 0 w 1540641"/>
+                <a:gd name="connsiteY4" fmla="*/ 2037104 h 2037104"/>
+                <a:gd name="connsiteX5" fmla="*/ 13951 w 1540641"/>
+                <a:gd name="connsiteY5" fmla="*/ 663148 h 2037104"/>
+                <a:gd name="connsiteX0" fmla="*/ 0 w 1526690"/>
+                <a:gd name="connsiteY0" fmla="*/ 663148 h 2037104"/>
+                <a:gd name="connsiteX1" fmla="*/ 741914 w 1526690"/>
+                <a:gd name="connsiteY1" fmla="*/ 0 h 2037104"/>
+                <a:gd name="connsiteX2" fmla="*/ 1526690 w 1526690"/>
+                <a:gd name="connsiteY2" fmla="*/ 667910 h 2037104"/>
+                <a:gd name="connsiteX3" fmla="*/ 1523178 w 1526690"/>
+                <a:gd name="connsiteY3" fmla="*/ 2037104 h 2037104"/>
+                <a:gd name="connsiteX4" fmla="*/ 337 w 1526690"/>
+                <a:gd name="connsiteY4" fmla="*/ 2032341 h 2037104"/>
+                <a:gd name="connsiteX5" fmla="*/ 0 w 1526690"/>
+                <a:gd name="connsiteY5" fmla="*/ 663148 h 2037104"/>
+                <a:gd name="connsiteX0" fmla="*/ 0 w 1526690"/>
+                <a:gd name="connsiteY0" fmla="*/ 648860 h 2022816"/>
+                <a:gd name="connsiteX1" fmla="*/ 770489 w 1526690"/>
+                <a:gd name="connsiteY1" fmla="*/ 0 h 2022816"/>
+                <a:gd name="connsiteX2" fmla="*/ 1526690 w 1526690"/>
+                <a:gd name="connsiteY2" fmla="*/ 653622 h 2022816"/>
+                <a:gd name="connsiteX3" fmla="*/ 1523178 w 1526690"/>
+                <a:gd name="connsiteY3" fmla="*/ 2022816 h 2022816"/>
+                <a:gd name="connsiteX4" fmla="*/ 337 w 1526690"/>
+                <a:gd name="connsiteY4" fmla="*/ 2018053 h 2022816"/>
+                <a:gd name="connsiteX5" fmla="*/ 0 w 1526690"/>
+                <a:gd name="connsiteY5" fmla="*/ 648860 h 2022816"/>
+                <a:gd name="connsiteX0" fmla="*/ 0 w 1526690"/>
+                <a:gd name="connsiteY0" fmla="*/ 0 h 1373956"/>
+                <a:gd name="connsiteX1" fmla="*/ 795545 w 1526690"/>
+                <a:gd name="connsiteY1" fmla="*/ 372 h 1373956"/>
+                <a:gd name="connsiteX2" fmla="*/ 1526690 w 1526690"/>
+                <a:gd name="connsiteY2" fmla="*/ 4762 h 1373956"/>
+                <a:gd name="connsiteX3" fmla="*/ 1523178 w 1526690"/>
+                <a:gd name="connsiteY3" fmla="*/ 1373956 h 1373956"/>
+                <a:gd name="connsiteX4" fmla="*/ 337 w 1526690"/>
+                <a:gd name="connsiteY4" fmla="*/ 1369193 h 1373956"/>
+                <a:gd name="connsiteX5" fmla="*/ 0 w 1526690"/>
+                <a:gd name="connsiteY5" fmla="*/ 0 h 1373956"/>
+              </a:gdLst>
+              <a:ahLst/>
+              <a:cxnLst>
+                <a:cxn ang="0">
+                  <a:pos x="connsiteX0" y="connsiteY0"/>
+                </a:cxn>
+                <a:cxn ang="0">
+                  <a:pos x="connsiteX1" y="connsiteY1"/>
+                </a:cxn>
+                <a:cxn ang="0">
+                  <a:pos x="connsiteX2" y="connsiteY2"/>
+                </a:cxn>
+                <a:cxn ang="0">
+                  <a:pos x="connsiteX3" y="connsiteY3"/>
+                </a:cxn>
+                <a:cxn ang="0">
+                  <a:pos x="connsiteX4" y="connsiteY4"/>
+                </a:cxn>
+                <a:cxn ang="0">
+                  <a:pos x="connsiteX5" y="connsiteY5"/>
+                </a:cxn>
+              </a:cxnLst>
+              <a:rect l="l" t="t" r="r" b="b"/>
+              <a:pathLst>
+                <a:path w="1526690" h="1373956">
+                  <a:moveTo>
+                    <a:pt x="0" y="0"/>
+                  </a:moveTo>
+                  <a:lnTo>
+                    <a:pt x="795545" y="372"/>
+                  </a:lnTo>
+                  <a:lnTo>
+                    <a:pt x="1526690" y="4762"/>
+                  </a:lnTo>
+                  <a:cubicBezTo>
+                    <a:pt x="1524990" y="466981"/>
+                    <a:pt x="1524878" y="911737"/>
+                    <a:pt x="1523178" y="1373956"/>
+                  </a:cubicBezTo>
+                  <a:lnTo>
+                    <a:pt x="337" y="1369193"/>
+                  </a:lnTo>
+                  <a:cubicBezTo>
+                    <a:pt x="225" y="912795"/>
+                    <a:pt x="112" y="456398"/>
+                    <a:pt x="0" y="0"/>
+                  </a:cubicBezTo>
+                  <a:close/>
+                </a:path>
+              </a:pathLst>
+            </a:custGeom>
+            <a:noFill/>
+          </p:spPr>
+          <p:style>
+            <a:lnRef idx="2">
+              <a:schemeClr val="accent1">
+                <a:shade val="50000"/>
+              </a:schemeClr>
+            </a:lnRef>
+            <a:fillRef idx="1">
+              <a:schemeClr val="accent1"/>
+            </a:fillRef>
+            <a:effectRef idx="0">
+              <a:schemeClr val="accent1"/>
+            </a:effectRef>
+            <a:fontRef idx="minor">
+              <a:schemeClr val="lt1"/>
+            </a:fontRef>
+          </p:style>
+          <p:txBody>
+            <a:bodyPr rtlCol="0" anchor="ctr"/>
+            <a:lstStyle/>
+            <a:p>
+              <a:pPr algn="ctr"/>
+              <a:endParaRPr lang="en-US"/>
+            </a:p>
+          </p:txBody>
+        </p:sp>
+      </p:grpSp>
+    </p:spTree>
+    <p:extLst>
+      <p:ext uri="{BB962C8B-B14F-4D97-AF65-F5344CB8AC3E}">
+        <p14:creationId xmlns:p14="http://schemas.microsoft.com/office/powerpoint/2010/main" val="160094593"/>
+      </p:ext>
+    </p:extLst>
+  </p:cSld>
+  <p:clrMapOvr>
+    <a:masterClrMapping/>
+  </p:clrMapOvr>
+</p:sld>
+</file>
+
 <file path=ppt/theme/theme1.xml><?xml version="1.0" encoding="utf-8"?>
 <a:theme xmlns:a="http://schemas.openxmlformats.org/drawingml/2006/main" name="Office Theme">
   <a:themeElements>

</xml_diff>

<commit_message>
added everything into a single file
</commit_message>
<xml_diff>
--- a/amr_schematics.pptx
+++ b/amr_schematics.pptx
@@ -4529,16 +4529,16 @@
       </p:grpSpPr>
       <p:grpSp>
         <p:nvGrpSpPr>
-          <p:cNvPr id="19" name="Group 18"/>
+          <p:cNvPr id="3" name="Group 2"/>
           <p:cNvGrpSpPr/>
           <p:nvPr/>
         </p:nvGrpSpPr>
         <p:grpSpPr>
           <a:xfrm>
-            <a:off x="1329142" y="2819854"/>
-            <a:ext cx="5300258" cy="2133146"/>
-            <a:chOff x="1329142" y="2819854"/>
-            <a:chExt cx="5300258" cy="2133146"/>
+            <a:off x="990600" y="2457777"/>
+            <a:ext cx="6096000" cy="2723823"/>
+            <a:chOff x="990600" y="2457777"/>
+            <a:chExt cx="6096000" cy="2723823"/>
           </a:xfrm>
         </p:grpSpPr>
         <p:sp>
@@ -5082,7 +5082,7 @@
           </p:nvSpPr>
           <p:spPr>
             <a:xfrm>
-              <a:off x="4460962" y="3442645"/>
+              <a:off x="4648200" y="3442645"/>
               <a:ext cx="137160" cy="137160"/>
             </a:xfrm>
             <a:prstGeom prst="ellipse">
@@ -5139,7 +5139,7 @@
           </p:nvSpPr>
           <p:spPr>
             <a:xfrm>
-              <a:off x="6492240" y="3442645"/>
+              <a:off x="6679478" y="3442645"/>
               <a:ext cx="137160" cy="137160"/>
             </a:xfrm>
             <a:prstGeom prst="ellipse">
@@ -5196,7 +5196,7 @@
           </p:nvSpPr>
           <p:spPr>
             <a:xfrm>
-              <a:off x="6492240" y="4815840"/>
+              <a:off x="6679478" y="4815840"/>
               <a:ext cx="137160" cy="137160"/>
             </a:xfrm>
             <a:prstGeom prst="ellipse">
@@ -5253,7 +5253,7 @@
           </p:nvSpPr>
           <p:spPr>
             <a:xfrm>
-              <a:off x="5492519" y="3465283"/>
+              <a:off x="5679757" y="3465283"/>
               <a:ext cx="137160" cy="137160"/>
             </a:xfrm>
             <a:prstGeom prst="ellipse">
@@ -5310,7 +5310,7 @@
           </p:nvSpPr>
           <p:spPr>
             <a:xfrm>
-              <a:off x="4460962" y="4815840"/>
+              <a:off x="4648200" y="4815840"/>
               <a:ext cx="137160" cy="137160"/>
             </a:xfrm>
             <a:prstGeom prst="ellipse">
@@ -5367,7 +5367,7 @@
           </p:nvSpPr>
           <p:spPr>
             <a:xfrm>
-              <a:off x="4529542" y="3533863"/>
+              <a:off x="4716780" y="3533863"/>
               <a:ext cx="2031278" cy="1350557"/>
             </a:xfrm>
             <a:custGeom>
@@ -5616,6 +5616,132 @@
             <a:p>
               <a:pPr algn="ctr"/>
               <a:endParaRPr lang="en-US"/>
+            </a:p>
+          </p:txBody>
+        </p:sp>
+        <p:sp>
+          <p:nvSpPr>
+            <p:cNvPr id="2" name="TextBox 1"/>
+            <p:cNvSpPr txBox="1"/>
+            <p:nvPr/>
+          </p:nvSpPr>
+          <p:spPr>
+            <a:xfrm>
+              <a:off x="990600" y="2457777"/>
+              <a:ext cx="2824696" cy="2723823"/>
+            </a:xfrm>
+            <a:prstGeom prst="rect">
+              <a:avLst/>
+            </a:prstGeom>
+            <a:noFill/>
+          </p:spPr>
+          <p:txBody>
+            <a:bodyPr wrap="square" rtlCol="0">
+              <a:spAutoFit/>
+            </a:bodyPr>
+            <a:lstStyle/>
+            <a:p>
+              <a:r>
+                <a:rPr lang="en-US" dirty="0" smtClean="0"/>
+                <a:t>                         E</a:t>
+              </a:r>
+            </a:p>
+            <a:p>
+              <a:endParaRPr lang="en-US" dirty="0"/>
+            </a:p>
+            <a:p>
+              <a:endParaRPr lang="en-US" dirty="0" smtClean="0"/>
+            </a:p>
+            <a:p>
+              <a:r>
+                <a:rPr lang="en-US" dirty="0" smtClean="0"/>
+                <a:t>D		             A</a:t>
+              </a:r>
+            </a:p>
+            <a:p>
+              <a:endParaRPr lang="en-US" dirty="0"/>
+            </a:p>
+            <a:p>
+              <a:endParaRPr lang="en-US" dirty="0" smtClean="0"/>
+            </a:p>
+            <a:p>
+              <a:endParaRPr lang="en-US" dirty="0"/>
+            </a:p>
+            <a:p>
+              <a:endParaRPr lang="en-US" dirty="0" smtClean="0"/>
+            </a:p>
+            <a:p>
+              <a:endParaRPr lang="en-US" sz="900" dirty="0"/>
+            </a:p>
+            <a:p>
+              <a:r>
+                <a:rPr lang="en-US" dirty="0" smtClean="0"/>
+                <a:t>C		             B</a:t>
+              </a:r>
+              <a:endParaRPr lang="en-US" dirty="0"/>
+            </a:p>
+          </p:txBody>
+        </p:sp>
+        <p:sp>
+          <p:nvSpPr>
+            <p:cNvPr id="20" name="TextBox 19"/>
+            <p:cNvSpPr txBox="1"/>
+            <p:nvPr/>
+          </p:nvSpPr>
+          <p:spPr>
+            <a:xfrm>
+              <a:off x="4261904" y="2457777"/>
+              <a:ext cx="2824696" cy="2723823"/>
+            </a:xfrm>
+            <a:prstGeom prst="rect">
+              <a:avLst/>
+            </a:prstGeom>
+            <a:noFill/>
+          </p:spPr>
+          <p:txBody>
+            <a:bodyPr wrap="square" rtlCol="0">
+              <a:spAutoFit/>
+            </a:bodyPr>
+            <a:lstStyle/>
+            <a:p>
+              <a:endParaRPr lang="en-US" dirty="0" smtClean="0"/>
+            </a:p>
+            <a:p>
+              <a:endParaRPr lang="en-US" dirty="0"/>
+            </a:p>
+            <a:p>
+              <a:r>
+                <a:rPr lang="en-US" dirty="0" smtClean="0"/>
+                <a:t>                         E</a:t>
+              </a:r>
+            </a:p>
+            <a:p>
+              <a:r>
+                <a:rPr lang="en-US" dirty="0" smtClean="0"/>
+                <a:t> D		             A</a:t>
+              </a:r>
+            </a:p>
+            <a:p>
+              <a:endParaRPr lang="en-US" dirty="0"/>
+            </a:p>
+            <a:p>
+              <a:endParaRPr lang="en-US" dirty="0" smtClean="0"/>
+            </a:p>
+            <a:p>
+              <a:endParaRPr lang="en-US" dirty="0"/>
+            </a:p>
+            <a:p>
+              <a:endParaRPr lang="en-US" dirty="0" smtClean="0"/>
+            </a:p>
+            <a:p>
+              <a:endParaRPr lang="en-US" sz="900" dirty="0"/>
+            </a:p>
+            <a:p>
+              <a:r>
+                <a:rPr lang="en-US" dirty="0" smtClean="0"/>
+                <a:t> C		             B</a:t>
+              </a:r>
+              <a:endParaRPr lang="en-US" dirty="0"/>
             </a:p>
           </p:txBody>
         </p:sp>

</xml_diff>